<commit_message>
after initial preparations for GI course
</commit_message>
<xml_diff>
--- a/docs/AugmentedRealityGame.pptx
+++ b/docs/AugmentedRealityGame.pptx
@@ -8,7 +8,13 @@
     <p:sldId id="256" r:id="rId2"/>
     <p:sldId id="257" r:id="rId3"/>
     <p:sldId id="263" r:id="rId4"/>
-    <p:sldId id="264" r:id="rId5"/>
+    <p:sldId id="265" r:id="rId5"/>
+    <p:sldId id="264" r:id="rId6"/>
+    <p:sldId id="266" r:id="rId7"/>
+    <p:sldId id="267" r:id="rId8"/>
+    <p:sldId id="268" r:id="rId9"/>
+    <p:sldId id="269" r:id="rId10"/>
+    <p:sldId id="270" r:id="rId11"/>
   </p:sldIdLst>
   <p:sldSz cx="12192000" cy="6858000"/>
   <p:notesSz cx="6858000" cy="9144000"/>
@@ -109,7 +115,18 @@
   </p:defaultTextStyle>
   <p:extLst>
     <p:ext uri="{EFAFB233-063F-42B5-8137-9DF3F51BA10A}">
-      <p15:sldGuideLst xmlns="" xmlns:p15="http://schemas.microsoft.com/office/powerpoint/2012/main"/>
+      <p15:sldGuideLst xmlns:p15="http://schemas.microsoft.com/office/powerpoint/2012/main">
+        <p15:guide id="1" orient="horz" pos="2160">
+          <p15:clr>
+            <a:srgbClr val="A4A3A4"/>
+          </p15:clr>
+        </p15:guide>
+        <p15:guide id="2" pos="3840">
+          <p15:clr>
+            <a:srgbClr val="A4A3A4"/>
+          </p15:clr>
+        </p15:guide>
+      </p15:sldGuideLst>
     </p:ext>
   </p:extLst>
 </p:presentation>
@@ -4781,7 +4798,7 @@
           <a:p>
             <a:fld id="{87119545-09C4-4660-BE15-2E85FFDBF8A7}" type="datetimeFigureOut">
               <a:rPr lang="en-US" smtClean="0"/>
-              <a:t>3/27/14</a:t>
+              <a:t>2014-05-17</a:t>
             </a:fld>
             <a:endParaRPr lang="en-US"/>
           </a:p>
@@ -5155,7 +5172,7 @@
           <a:p>
             <a:fld id="{87119545-09C4-4660-BE15-2E85FFDBF8A7}" type="datetimeFigureOut">
               <a:rPr lang="en-US" smtClean="0"/>
-              <a:t>3/27/14</a:t>
+              <a:t>2014-05-17</a:t>
             </a:fld>
             <a:endParaRPr lang="en-US"/>
           </a:p>
@@ -5532,7 +5549,7 @@
           <a:p>
             <a:fld id="{87119545-09C4-4660-BE15-2E85FFDBF8A7}" type="datetimeFigureOut">
               <a:rPr lang="en-US" smtClean="0"/>
-              <a:t>3/27/14</a:t>
+              <a:t>2014-05-17</a:t>
             </a:fld>
             <a:endParaRPr lang="en-US"/>
           </a:p>
@@ -6041,7 +6058,7 @@
           <a:p>
             <a:fld id="{87119545-09C4-4660-BE15-2E85FFDBF8A7}" type="datetimeFigureOut">
               <a:rPr lang="en-US" smtClean="0"/>
-              <a:t>3/27/14</a:t>
+              <a:t>2014-05-17</a:t>
             </a:fld>
             <a:endParaRPr lang="en-US"/>
           </a:p>
@@ -6282,7 +6299,7 @@
           <a:p>
             <a:fld id="{87119545-09C4-4660-BE15-2E85FFDBF8A7}" type="datetimeFigureOut">
               <a:rPr lang="en-US" smtClean="0"/>
-              <a:t>3/27/14</a:t>
+              <a:t>2014-05-17</a:t>
             </a:fld>
             <a:endParaRPr lang="en-US"/>
           </a:p>
@@ -6513,7 +6530,7 @@
           <a:p>
             <a:fld id="{87119545-09C4-4660-BE15-2E85FFDBF8A7}" type="datetimeFigureOut">
               <a:rPr lang="en-US" smtClean="0"/>
-              <a:t>3/27/14</a:t>
+              <a:t>2014-05-17</a:t>
             </a:fld>
             <a:endParaRPr lang="en-US"/>
           </a:p>
@@ -13869,7 +13886,7 @@
           <a:p>
             <a:fld id="{87119545-09C4-4660-BE15-2E85FFDBF8A7}" type="datetimeFigureOut">
               <a:rPr lang="en-US" smtClean="0"/>
-              <a:t>3/27/14</a:t>
+              <a:t>2014-05-17</a:t>
             </a:fld>
             <a:endParaRPr lang="en-US"/>
           </a:p>
@@ -14406,7 +14423,7 @@
           <a:p>
             <a:fld id="{87119545-09C4-4660-BE15-2E85FFDBF8A7}" type="datetimeFigureOut">
               <a:rPr lang="en-US" smtClean="0"/>
-              <a:t>3/27/14</a:t>
+              <a:t>2014-05-17</a:t>
             </a:fld>
             <a:endParaRPr lang="en-US"/>
           </a:p>
@@ -14581,7 +14598,7 @@
           <a:p>
             <a:fld id="{87119545-09C4-4660-BE15-2E85FFDBF8A7}" type="datetimeFigureOut">
               <a:rPr lang="en-US" smtClean="0"/>
-              <a:t>3/27/14</a:t>
+              <a:t>2014-05-17</a:t>
             </a:fld>
             <a:endParaRPr lang="en-US"/>
           </a:p>
@@ -14671,7 +14688,7 @@
           <a:p>
             <a:fld id="{87119545-09C4-4660-BE15-2E85FFDBF8A7}" type="datetimeFigureOut">
               <a:rPr lang="en-US" smtClean="0"/>
-              <a:t>3/27/14</a:t>
+              <a:t>2014-05-17</a:t>
             </a:fld>
             <a:endParaRPr lang="en-US"/>
           </a:p>
@@ -15007,7 +15024,7 @@
           <a:p>
             <a:fld id="{87119545-09C4-4660-BE15-2E85FFDBF8A7}" type="datetimeFigureOut">
               <a:rPr lang="en-US" smtClean="0"/>
-              <a:t>3/27/14</a:t>
+              <a:t>2014-05-17</a:t>
             </a:fld>
             <a:endParaRPr lang="en-US"/>
           </a:p>
@@ -16427,7 +16444,7 @@
           <a:p>
             <a:fld id="{87119545-09C4-4660-BE15-2E85FFDBF8A7}" type="datetimeFigureOut">
               <a:rPr lang="en-US" smtClean="0"/>
-              <a:t>3/27/14</a:t>
+              <a:t>2014-05-17</a:t>
             </a:fld>
             <a:endParaRPr lang="en-US"/>
           </a:p>
@@ -17350,7 +17367,290 @@
   <p:timing>
     <p:tnLst>
       <p:par>
-        <p:cTn xmlns:p14="http://schemas.microsoft.com/office/powerpoint/2010/main" id="1" dur="indefinite" restart="never" nodeType="tmRoot"/>
+        <p:cTn id="1" dur="indefinite" restart="never" nodeType="tmRoot"/>
+      </p:par>
+    </p:tnLst>
+  </p:timing>
+</p:sld>
+</file>
+
+<file path=ppt/slides/slide10.xml><?xml version="1.0" encoding="utf-8"?>
+<p:sld xmlns:a="http://schemas.openxmlformats.org/drawingml/2006/main" xmlns:r="http://schemas.openxmlformats.org/officeDocument/2006/relationships" xmlns:p="http://schemas.openxmlformats.org/presentationml/2006/main">
+  <p:cSld>
+    <p:spTree>
+      <p:nvGrpSpPr>
+        <p:cNvPr id="1" name=""/>
+        <p:cNvGrpSpPr/>
+        <p:nvPr/>
+      </p:nvGrpSpPr>
+      <p:grpSpPr>
+        <a:xfrm>
+          <a:off x="0" y="0"/>
+          <a:ext cx="0" cy="0"/>
+          <a:chOff x="0" y="0"/>
+          <a:chExt cx="0" cy="0"/>
+        </a:xfrm>
+      </p:grpSpPr>
+      <p:sp>
+        <p:nvSpPr>
+          <p:cNvPr id="2" name="Title 1"/>
+          <p:cNvSpPr>
+            <a:spLocks noGrp="1"/>
+          </p:cNvSpPr>
+          <p:nvPr>
+            <p:ph type="title"/>
+          </p:nvPr>
+        </p:nvSpPr>
+        <p:spPr/>
+        <p:txBody>
+          <a:bodyPr/>
+          <a:lstStyle/>
+          <a:p>
+            <a:r>
+              <a:rPr lang="en-US" dirty="0" smtClean="0"/>
+              <a:t>Thank you!</a:t>
+            </a:r>
+            <a:endParaRPr lang="en-US" dirty="0"/>
+          </a:p>
+        </p:txBody>
+      </p:sp>
+      <p:sp>
+        <p:nvSpPr>
+          <p:cNvPr id="3" name="Content Placeholder 2"/>
+          <p:cNvSpPr>
+            <a:spLocks noGrp="1"/>
+          </p:cNvSpPr>
+          <p:nvPr>
+            <p:ph idx="1"/>
+          </p:nvPr>
+        </p:nvSpPr>
+        <p:spPr/>
+        <p:txBody>
+          <a:bodyPr>
+            <a:normAutofit fontScale="55000" lnSpcReduction="20000"/>
+          </a:bodyPr>
+          <a:lstStyle/>
+          <a:p>
+            <a:endParaRPr lang="en-US" dirty="0" smtClean="0"/>
+          </a:p>
+          <a:p>
+            <a:endParaRPr lang="en-US" dirty="0"/>
+          </a:p>
+          <a:p>
+            <a:endParaRPr lang="en-US" dirty="0" smtClean="0"/>
+          </a:p>
+          <a:p>
+            <a:endParaRPr lang="en-US" dirty="0"/>
+          </a:p>
+          <a:p>
+            <a:r>
+              <a:rPr lang="en-US" sz="4500" dirty="0" smtClean="0"/>
+              <a:t>Follow – up: soon on your device…</a:t>
+            </a:r>
+          </a:p>
+          <a:p>
+            <a:pPr marL="0" indent="0" algn="ctr">
+              <a:buNone/>
+            </a:pPr>
+            <a:r>
+              <a:rPr lang="en-US" sz="9600" dirty="0" smtClean="0">
+                <a:sym typeface="Wingdings" panose="05000000000000000000" pitchFamily="2" charset="2"/>
+              </a:rPr>
+              <a:t></a:t>
+            </a:r>
+            <a:endParaRPr lang="en-US" sz="9600" dirty="0"/>
+          </a:p>
+          <a:p>
+            <a:endParaRPr lang="en-US" dirty="0" smtClean="0"/>
+          </a:p>
+          <a:p>
+            <a:pPr lvl="1"/>
+            <a:endParaRPr lang="en-US" dirty="0" smtClean="0"/>
+          </a:p>
+          <a:p>
+            <a:endParaRPr lang="en-US" dirty="0"/>
+          </a:p>
+        </p:txBody>
+      </p:sp>
+      <p:grpSp>
+        <p:nvGrpSpPr>
+          <p:cNvPr id="8" name="Group 7"/>
+          <p:cNvGrpSpPr/>
+          <p:nvPr/>
+        </p:nvGrpSpPr>
+        <p:grpSpPr>
+          <a:xfrm>
+            <a:off x="9781784" y="855084"/>
+            <a:ext cx="1365466" cy="2211683"/>
+            <a:chOff x="2856785" y="57091"/>
+            <a:chExt cx="3846469" cy="6258661"/>
+          </a:xfrm>
+        </p:grpSpPr>
+        <p:sp>
+          <p:nvSpPr>
+            <p:cNvPr id="4" name="Rectangle 3"/>
+            <p:cNvSpPr/>
+            <p:nvPr/>
+          </p:nvSpPr>
+          <p:spPr>
+            <a:xfrm>
+              <a:off x="4046094" y="4981074"/>
+              <a:ext cx="1271864" cy="1049033"/>
+            </a:xfrm>
+            <a:prstGeom prst="rect">
+              <a:avLst/>
+            </a:prstGeom>
+            <a:solidFill>
+              <a:schemeClr val="bg1">
+                <a:lumMod val="65000"/>
+              </a:schemeClr>
+            </a:solidFill>
+          </p:spPr>
+          <p:style>
+            <a:lnRef idx="2">
+              <a:schemeClr val="accent1">
+                <a:shade val="50000"/>
+              </a:schemeClr>
+            </a:lnRef>
+            <a:fillRef idx="1">
+              <a:schemeClr val="accent1"/>
+            </a:fillRef>
+            <a:effectRef idx="0">
+              <a:schemeClr val="accent1"/>
+            </a:effectRef>
+            <a:fontRef idx="minor">
+              <a:schemeClr val="lt1"/>
+            </a:fontRef>
+          </p:style>
+          <p:txBody>
+            <a:bodyPr rtlCol="0" anchor="ctr"/>
+            <a:lstStyle/>
+            <a:p>
+              <a:pPr algn="ctr"/>
+              <a:endParaRPr lang="en-US"/>
+            </a:p>
+          </p:txBody>
+        </p:sp>
+        <p:sp>
+          <p:nvSpPr>
+            <p:cNvPr id="5" name="Rectangle 4"/>
+            <p:cNvSpPr/>
+            <p:nvPr/>
+          </p:nvSpPr>
+          <p:spPr>
+            <a:xfrm>
+              <a:off x="4144088" y="360122"/>
+              <a:ext cx="1271864" cy="269309"/>
+            </a:xfrm>
+            <a:prstGeom prst="rect">
+              <a:avLst/>
+            </a:prstGeom>
+            <a:solidFill>
+              <a:schemeClr val="bg1">
+                <a:lumMod val="65000"/>
+              </a:schemeClr>
+            </a:solidFill>
+          </p:spPr>
+          <p:style>
+            <a:lnRef idx="2">
+              <a:schemeClr val="accent1">
+                <a:shade val="50000"/>
+              </a:schemeClr>
+            </a:lnRef>
+            <a:fillRef idx="1">
+              <a:schemeClr val="accent1"/>
+            </a:fillRef>
+            <a:effectRef idx="0">
+              <a:schemeClr val="accent1"/>
+            </a:effectRef>
+            <a:fontRef idx="minor">
+              <a:schemeClr val="lt1"/>
+            </a:fontRef>
+          </p:style>
+          <p:txBody>
+            <a:bodyPr rtlCol="0" anchor="ctr"/>
+            <a:lstStyle/>
+            <a:p>
+              <a:pPr algn="ctr"/>
+              <a:endParaRPr lang="en-US"/>
+            </a:p>
+          </p:txBody>
+        </p:sp>
+        <p:pic>
+          <p:nvPicPr>
+            <p:cNvPr id="6" name="Content Placeholder 3"/>
+            <p:cNvPicPr>
+              <a:picLocks noChangeAspect="1"/>
+            </p:cNvPicPr>
+            <p:nvPr/>
+          </p:nvPicPr>
+          <p:blipFill>
+            <a:blip r:embed="rId2" cstate="print">
+              <a:extLst>
+                <a:ext uri="{28A0092B-C50C-407E-A947-70E740481C1C}">
+                  <a14:useLocalDpi xmlns:a14="http://schemas.microsoft.com/office/drawing/2010/main" val="0"/>
+                </a:ext>
+              </a:extLst>
+            </a:blip>
+            <a:stretch>
+              <a:fillRect/>
+            </a:stretch>
+          </p:blipFill>
+          <p:spPr>
+            <a:xfrm>
+              <a:off x="3042365" y="439383"/>
+              <a:ext cx="3478752" cy="4517630"/>
+            </a:xfrm>
+            <a:prstGeom prst="rect">
+              <a:avLst/>
+            </a:prstGeom>
+          </p:spPr>
+        </p:pic>
+        <p:pic>
+          <p:nvPicPr>
+            <p:cNvPr id="7" name="Picture 6"/>
+            <p:cNvPicPr>
+              <a:picLocks noChangeAspect="1"/>
+            </p:cNvPicPr>
+            <p:nvPr/>
+          </p:nvPicPr>
+          <p:blipFill>
+            <a:blip r:embed="rId3">
+              <a:extLst>
+                <a:ext uri="{28A0092B-C50C-407E-A947-70E740481C1C}">
+                  <a14:useLocalDpi xmlns:a14="http://schemas.microsoft.com/office/drawing/2010/main" val="0"/>
+                </a:ext>
+              </a:extLst>
+            </a:blip>
+            <a:stretch>
+              <a:fillRect/>
+            </a:stretch>
+          </p:blipFill>
+          <p:spPr>
+            <a:xfrm>
+              <a:off x="2856785" y="57091"/>
+              <a:ext cx="3846469" cy="6258661"/>
+            </a:xfrm>
+            <a:prstGeom prst="rect">
+              <a:avLst/>
+            </a:prstGeom>
+          </p:spPr>
+        </p:pic>
+      </p:grpSp>
+    </p:spTree>
+    <p:extLst>
+      <p:ext uri="{BB962C8B-B14F-4D97-AF65-F5344CB8AC3E}">
+        <p14:creationId xmlns:p14="http://schemas.microsoft.com/office/powerpoint/2010/main" val="2181449962"/>
+      </p:ext>
+    </p:extLst>
+  </p:cSld>
+  <p:clrMapOvr>
+    <a:masterClrMapping/>
+  </p:clrMapOvr>
+  <p:timing>
+    <p:tnLst>
+      <p:par>
+        <p:cTn id="1" dur="indefinite" restart="never" nodeType="tmRoot"/>
       </p:par>
     </p:tnLst>
   </p:timing>
@@ -17422,96 +17722,64 @@
           <a:lstStyle/>
           <a:p>
             <a:r>
-              <a:rPr lang="en-US" sz="2800" dirty="0"/>
-              <a:t>Gameplay – </a:t>
+              <a:rPr lang="en-US" dirty="0" smtClean="0"/>
+              <a:t>Augmented Reality game in which the player interacts with its environment – destroying it as the game progress.</a:t>
             </a:r>
+          </a:p>
+          <a:p>
+            <a:endParaRPr lang="en-US" dirty="0"/>
+          </a:p>
+          <a:p>
             <a:r>
-              <a:rPr lang="en-US" sz="2800" dirty="0" smtClean="0"/>
-              <a:t>Destroying Objects</a:t>
+              <a:rPr lang="en-US" dirty="0" smtClean="0"/>
+              <a:t>Traditional “wall-breaker” on steroids:</a:t>
             </a:r>
           </a:p>
           <a:p>
             <a:pPr marL="285750" indent="-285750">
-              <a:buFontTx/>
+              <a:buFont typeface="Arial" panose="020B0604020202020204" pitchFamily="34" charset="0"/>
               <a:buChar char="•"/>
             </a:pPr>
             <a:r>
               <a:rPr lang="en-US" dirty="0" smtClean="0"/>
-              <a:t>Shooter</a:t>
+              <a:t>The walls are real walls (or clock, or pictures or buildings)</a:t>
             </a:r>
           </a:p>
           <a:p>
             <a:pPr marL="285750" indent="-285750">
-              <a:buFontTx/>
+              <a:buFont typeface="Arial" panose="020B0604020202020204" pitchFamily="34" charset="0"/>
               <a:buChar char="•"/>
             </a:pPr>
             <a:r>
               <a:rPr lang="en-US" dirty="0" smtClean="0"/>
-              <a:t>Ball </a:t>
+              <a:t>The scene is the world – any place can transform into an exciting game scene</a:t>
             </a:r>
-            <a:r>
-              <a:rPr lang="en-US" dirty="0"/>
-              <a:t>(wall breaker</a:t>
-            </a:r>
-            <a:r>
-              <a:rPr lang="en-US" dirty="0" smtClean="0"/>
-              <a:t>)</a:t>
-            </a:r>
           </a:p>
           <a:p>
             <a:pPr marL="285750" indent="-285750">
-              <a:buFontTx/>
-              <a:buChar char="•"/>
-            </a:pPr>
-            <a:endParaRPr lang="en-US" dirty="0" smtClean="0"/>
-          </a:p>
-          <a:p>
-            <a:r>
-              <a:rPr lang="en-US" sz="2800" dirty="0" smtClean="0"/>
-              <a:t>Why? What is the incentive?</a:t>
-            </a:r>
-            <a:endParaRPr lang="en-US" sz="2800" dirty="0"/>
-          </a:p>
-          <a:p>
-            <a:pPr marL="285750" indent="-285750">
-              <a:buFontTx/>
+              <a:buFont typeface="Arial" panose="020B0604020202020204" pitchFamily="34" charset="0"/>
               <a:buChar char="•"/>
             </a:pPr>
             <a:r>
               <a:rPr lang="en-US" dirty="0" smtClean="0"/>
-              <a:t>Fun</a:t>
+              <a:t>Adopted to up-to-date devices using touch…</a:t>
             </a:r>
           </a:p>
           <a:p>
             <a:pPr marL="285750" indent="-285750">
-              <a:buFontTx/>
+              <a:buFont typeface="Arial" panose="020B0604020202020204" pitchFamily="34" charset="0"/>
               <a:buChar char="•"/>
             </a:pPr>
             <a:r>
               <a:rPr lang="en-US" dirty="0" smtClean="0"/>
-              <a:t>Multiplayer</a:t>
+              <a:t>Bring in social aspects (which did not exist in the original creation time)</a:t>
             </a:r>
           </a:p>
           <a:p>
             <a:pPr marL="285750" indent="-285750">
-              <a:buFontTx/>
+              <a:buFont typeface="Arial" panose="020B0604020202020204" pitchFamily="34" charset="0"/>
               <a:buChar char="•"/>
             </a:pPr>
-            <a:r>
-              <a:rPr lang="en-US" dirty="0" smtClean="0"/>
-              <a:t>Share</a:t>
-            </a:r>
-            <a:r>
-              <a:rPr lang="en-US" dirty="0"/>
-              <a:t> </a:t>
-            </a:r>
-            <a:r>
-              <a:rPr lang="en-US" dirty="0" smtClean="0"/>
-              <a:t>via social networking (?)</a:t>
-            </a:r>
-            <a:endParaRPr lang="en-US" dirty="0"/>
-          </a:p>
-          <a:p>
             <a:endParaRPr lang="en-US" dirty="0"/>
           </a:p>
         </p:txBody>
@@ -17679,7 +17947,7 @@
   <p:timing>
     <p:tnLst>
       <p:par>
-        <p:cTn xmlns:p14="http://schemas.microsoft.com/office/powerpoint/2010/main" id="1" dur="indefinite" restart="never" nodeType="tmRoot">
+        <p:cTn id="1" dur="indefinite" restart="never" nodeType="tmRoot">
           <p:childTnLst>
             <p:seq concurrent="1" nextAc="seek">
               <p:cTn id="2" dur="indefinite" nodeType="mainSeq">
@@ -17905,7 +18173,7 @@
           <a:p>
             <a:r>
               <a:rPr lang="en-US" dirty="0" smtClean="0"/>
-              <a:t>Challenges Ahead</a:t>
+              <a:t>Why another “Wall Breaker”?</a:t>
             </a:r>
             <a:endParaRPr lang="en-US" dirty="0"/>
           </a:p>
@@ -17934,34 +18202,22 @@
           <a:lstStyle/>
           <a:p>
             <a:r>
-              <a:rPr lang="en-US" sz="3600" dirty="0" smtClean="0"/>
-              <a:t>Identify features in image</a:t>
+              <a:rPr lang="en-US" sz="2800" dirty="0" smtClean="0"/>
+              <a:t>Traditional Games isolates the player</a:t>
             </a:r>
           </a:p>
           <a:p>
-            <a:pPr lvl="1"/>
             <a:r>
-              <a:rPr lang="en-US" sz="3600" dirty="0" smtClean="0"/>
-              <a:t>Contours?</a:t>
+              <a:rPr lang="en-US" sz="2800" dirty="0" smtClean="0"/>
+              <a:t>We want the player to interact in the world</a:t>
             </a:r>
           </a:p>
           <a:p>
-            <a:pPr lvl="1"/>
             <a:r>
-              <a:rPr lang="en-US" sz="3600" dirty="0" smtClean="0"/>
-              <a:t>Edges?</a:t>
+              <a:rPr lang="en-US" sz="2800" dirty="0" smtClean="0"/>
+              <a:t>Viewing the real world via camera, the player has to react to its environment</a:t>
             </a:r>
-          </a:p>
-          <a:p>
-            <a:pPr lvl="1"/>
-            <a:r>
-              <a:rPr lang="en-US" sz="3600" dirty="0" smtClean="0"/>
-              <a:t>Gradients</a:t>
-            </a:r>
-            <a:endParaRPr lang="en-US" dirty="0" smtClean="0"/>
-          </a:p>
-          <a:p>
-            <a:endParaRPr lang="en-US" dirty="0"/>
+            <a:endParaRPr lang="en-US" sz="2800" dirty="0" smtClean="0"/>
           </a:p>
         </p:txBody>
       </p:sp>
@@ -18398,29 +18654,9 @@
           </a:lstStyle>
           <a:p>
             <a:r>
-              <a:rPr lang="en-US" sz="2800" dirty="0" smtClean="0"/>
-              <a:t>Can infer textures?</a:t>
+              <a:rPr lang="en-US" dirty="0" smtClean="0"/>
+              <a:t>No more crouching on top of the device – now you have to face reality</a:t>
             </a:r>
-          </a:p>
-          <a:p>
-            <a:r>
-              <a:rPr lang="en-US" sz="2800" dirty="0" smtClean="0"/>
-              <a:t>Can understand physics?</a:t>
-            </a:r>
-          </a:p>
-          <a:p>
-            <a:r>
-              <a:rPr lang="en-US" sz="2800" dirty="0" smtClean="0"/>
-              <a:t>How to realistically change the image as the game progress</a:t>
-            </a:r>
-          </a:p>
-          <a:p>
-            <a:r>
-              <a:rPr lang="en-US" sz="2800" dirty="0" smtClean="0"/>
-              <a:t>Identify obstacles in the picture</a:t>
-            </a:r>
-          </a:p>
-          <a:p>
             <a:endParaRPr lang="en-US" dirty="0"/>
           </a:p>
         </p:txBody>
@@ -18438,7 +18674,7 @@
   <p:timing>
     <p:tnLst>
       <p:par>
-        <p:cTn xmlns:p14="http://schemas.microsoft.com/office/powerpoint/2010/main" id="1" dur="indefinite" restart="never" nodeType="tmRoot"/>
+        <p:cTn id="1" dur="indefinite" restart="never" nodeType="tmRoot"/>
       </p:par>
     </p:tnLst>
   </p:timing>
@@ -18479,7 +18715,547 @@
           <a:p>
             <a:r>
               <a:rPr lang="en-US" dirty="0" smtClean="0"/>
-              <a:t>Technologies</a:t>
+              <a:t>Also, real scenes</a:t>
+            </a:r>
+            <a:endParaRPr lang="en-US" dirty="0"/>
+          </a:p>
+        </p:txBody>
+      </p:sp>
+      <p:sp>
+        <p:nvSpPr>
+          <p:cNvPr id="3" name="Content Placeholder 2"/>
+          <p:cNvSpPr>
+            <a:spLocks noGrp="1"/>
+          </p:cNvSpPr>
+          <p:nvPr>
+            <p:ph idx="1"/>
+          </p:nvPr>
+        </p:nvSpPr>
+        <p:spPr>
+          <a:xfrm>
+            <a:off x="950385" y="3012142"/>
+            <a:ext cx="4947936" cy="3388658"/>
+          </a:xfrm>
+        </p:spPr>
+        <p:txBody>
+          <a:bodyPr>
+            <a:normAutofit/>
+          </a:bodyPr>
+          <a:lstStyle/>
+          <a:p>
+            <a:r>
+              <a:rPr lang="en-US" sz="2800" dirty="0" smtClean="0"/>
+              <a:t>Is meaningful to share (e.g. I just destroyed Eiffel Tower)</a:t>
+            </a:r>
+          </a:p>
+          <a:p>
+            <a:r>
+              <a:rPr lang="en-US" sz="2800" dirty="0" smtClean="0"/>
+              <a:t>More than one person can play in the same scene</a:t>
+            </a:r>
+          </a:p>
+          <a:p>
+            <a:endParaRPr lang="en-US" sz="2800" dirty="0" smtClean="0"/>
+          </a:p>
+        </p:txBody>
+      </p:sp>
+      <p:grpSp>
+        <p:nvGrpSpPr>
+          <p:cNvPr id="8" name="Group 7"/>
+          <p:cNvGrpSpPr/>
+          <p:nvPr/>
+        </p:nvGrpSpPr>
+        <p:grpSpPr>
+          <a:xfrm>
+            <a:off x="9708512" y="1123727"/>
+            <a:ext cx="1365466" cy="2211683"/>
+            <a:chOff x="2856785" y="57091"/>
+            <a:chExt cx="3846469" cy="6258661"/>
+          </a:xfrm>
+        </p:grpSpPr>
+        <p:sp>
+          <p:nvSpPr>
+            <p:cNvPr id="4" name="Rectangle 3"/>
+            <p:cNvSpPr/>
+            <p:nvPr/>
+          </p:nvSpPr>
+          <p:spPr>
+            <a:xfrm>
+              <a:off x="4046094" y="4981074"/>
+              <a:ext cx="1271864" cy="1049033"/>
+            </a:xfrm>
+            <a:prstGeom prst="rect">
+              <a:avLst/>
+            </a:prstGeom>
+            <a:solidFill>
+              <a:schemeClr val="bg1">
+                <a:lumMod val="65000"/>
+              </a:schemeClr>
+            </a:solidFill>
+          </p:spPr>
+          <p:style>
+            <a:lnRef idx="2">
+              <a:schemeClr val="accent1">
+                <a:shade val="50000"/>
+              </a:schemeClr>
+            </a:lnRef>
+            <a:fillRef idx="1">
+              <a:schemeClr val="accent1"/>
+            </a:fillRef>
+            <a:effectRef idx="0">
+              <a:schemeClr val="accent1"/>
+            </a:effectRef>
+            <a:fontRef idx="minor">
+              <a:schemeClr val="lt1"/>
+            </a:fontRef>
+          </p:style>
+          <p:txBody>
+            <a:bodyPr rtlCol="0" anchor="ctr"/>
+            <a:lstStyle/>
+            <a:p>
+              <a:pPr algn="ctr"/>
+              <a:endParaRPr lang="en-US"/>
+            </a:p>
+          </p:txBody>
+        </p:sp>
+        <p:sp>
+          <p:nvSpPr>
+            <p:cNvPr id="5" name="Rectangle 4"/>
+            <p:cNvSpPr/>
+            <p:nvPr/>
+          </p:nvSpPr>
+          <p:spPr>
+            <a:xfrm>
+              <a:off x="4144088" y="360122"/>
+              <a:ext cx="1271864" cy="269309"/>
+            </a:xfrm>
+            <a:prstGeom prst="rect">
+              <a:avLst/>
+            </a:prstGeom>
+            <a:solidFill>
+              <a:schemeClr val="bg1">
+                <a:lumMod val="65000"/>
+              </a:schemeClr>
+            </a:solidFill>
+          </p:spPr>
+          <p:style>
+            <a:lnRef idx="2">
+              <a:schemeClr val="accent1">
+                <a:shade val="50000"/>
+              </a:schemeClr>
+            </a:lnRef>
+            <a:fillRef idx="1">
+              <a:schemeClr val="accent1"/>
+            </a:fillRef>
+            <a:effectRef idx="0">
+              <a:schemeClr val="accent1"/>
+            </a:effectRef>
+            <a:fontRef idx="minor">
+              <a:schemeClr val="lt1"/>
+            </a:fontRef>
+          </p:style>
+          <p:txBody>
+            <a:bodyPr rtlCol="0" anchor="ctr"/>
+            <a:lstStyle/>
+            <a:p>
+              <a:pPr algn="ctr"/>
+              <a:endParaRPr lang="en-US"/>
+            </a:p>
+          </p:txBody>
+        </p:sp>
+        <p:pic>
+          <p:nvPicPr>
+            <p:cNvPr id="6" name="Content Placeholder 3"/>
+            <p:cNvPicPr>
+              <a:picLocks noChangeAspect="1"/>
+            </p:cNvPicPr>
+            <p:nvPr/>
+          </p:nvPicPr>
+          <p:blipFill>
+            <a:blip r:embed="rId2" cstate="print">
+              <a:extLst>
+                <a:ext uri="{28A0092B-C50C-407E-A947-70E740481C1C}">
+                  <a14:useLocalDpi xmlns:a14="http://schemas.microsoft.com/office/drawing/2010/main" val="0"/>
+                </a:ext>
+              </a:extLst>
+            </a:blip>
+            <a:stretch>
+              <a:fillRect/>
+            </a:stretch>
+          </p:blipFill>
+          <p:spPr>
+            <a:xfrm>
+              <a:off x="3042365" y="439383"/>
+              <a:ext cx="3478752" cy="4517630"/>
+            </a:xfrm>
+            <a:prstGeom prst="rect">
+              <a:avLst/>
+            </a:prstGeom>
+          </p:spPr>
+        </p:pic>
+        <p:pic>
+          <p:nvPicPr>
+            <p:cNvPr id="7" name="Picture 6"/>
+            <p:cNvPicPr>
+              <a:picLocks noChangeAspect="1"/>
+            </p:cNvPicPr>
+            <p:nvPr/>
+          </p:nvPicPr>
+          <p:blipFill>
+            <a:blip r:embed="rId3">
+              <a:extLst>
+                <a:ext uri="{28A0092B-C50C-407E-A947-70E740481C1C}">
+                  <a14:useLocalDpi xmlns:a14="http://schemas.microsoft.com/office/drawing/2010/main" val="0"/>
+                </a:ext>
+              </a:extLst>
+            </a:blip>
+            <a:stretch>
+              <a:fillRect/>
+            </a:stretch>
+          </p:blipFill>
+          <p:spPr>
+            <a:xfrm>
+              <a:off x="2856785" y="57091"/>
+              <a:ext cx="3846469" cy="6258661"/>
+            </a:xfrm>
+            <a:prstGeom prst="rect">
+              <a:avLst/>
+            </a:prstGeom>
+          </p:spPr>
+        </p:pic>
+      </p:grpSp>
+      <p:sp>
+        <p:nvSpPr>
+          <p:cNvPr id="9" name="Content Placeholder 2"/>
+          <p:cNvSpPr txBox="1">
+            <a:spLocks/>
+          </p:cNvSpPr>
+          <p:nvPr/>
+        </p:nvSpPr>
+        <p:spPr>
+          <a:xfrm>
+            <a:off x="5902040" y="3164542"/>
+            <a:ext cx="5961520" cy="3388658"/>
+          </a:xfrm>
+          <a:prstGeom prst="rect">
+            <a:avLst/>
+          </a:prstGeom>
+        </p:spPr>
+        <p:txBody>
+          <a:bodyPr vert="horz" lIns="91440" tIns="45720" rIns="91440" bIns="45720" rtlCol="0">
+            <a:normAutofit/>
+          </a:bodyPr>
+          <a:lstStyle>
+            <a:lvl1pPr marL="342900" indent="-342900" algn="l" defTabSz="914400" rtl="0" eaLnBrk="1" latinLnBrk="0" hangingPunct="1">
+              <a:spcBef>
+                <a:spcPts val="0"/>
+              </a:spcBef>
+              <a:spcAft>
+                <a:spcPts val="2000"/>
+              </a:spcAft>
+              <a:buFontTx/>
+              <a:buBlip>
+                <a:blip r:embed="rId4"/>
+              </a:buBlip>
+              <a:defRPr sz="2400" kern="1200">
+                <a:solidFill>
+                  <a:schemeClr val="bg1"/>
+                </a:solidFill>
+                <a:effectLst>
+                  <a:outerShdw blurRad="38100" dist="38100" dir="2700000" algn="tl">
+                    <a:srgbClr val="000000">
+                      <a:alpha val="43137"/>
+                    </a:srgbClr>
+                  </a:outerShdw>
+                </a:effectLst>
+                <a:latin typeface="+mn-lt"/>
+                <a:ea typeface="+mn-ea"/>
+                <a:cs typeface="+mn-cs"/>
+              </a:defRPr>
+            </a:lvl1pPr>
+            <a:lvl2pPr marL="631825" indent="-282575" algn="l" defTabSz="914400" rtl="0" eaLnBrk="1" latinLnBrk="0" hangingPunct="1">
+              <a:spcBef>
+                <a:spcPts val="0"/>
+              </a:spcBef>
+              <a:spcAft>
+                <a:spcPts val="1000"/>
+              </a:spcAft>
+              <a:buFontTx/>
+              <a:buBlip>
+                <a:blip r:embed="rId4"/>
+              </a:buBlip>
+              <a:defRPr sz="2200" kern="1200">
+                <a:solidFill>
+                  <a:schemeClr val="bg1"/>
+                </a:solidFill>
+                <a:effectLst>
+                  <a:outerShdw blurRad="38100" dist="38100" dir="2700000" algn="tl">
+                    <a:srgbClr val="000000">
+                      <a:alpha val="43137"/>
+                    </a:srgbClr>
+                  </a:outerShdw>
+                </a:effectLst>
+                <a:latin typeface="+mn-lt"/>
+                <a:ea typeface="+mn-ea"/>
+                <a:cs typeface="+mn-cs"/>
+              </a:defRPr>
+            </a:lvl2pPr>
+            <a:lvl3pPr marL="914400" indent="-282575" algn="l" defTabSz="914400" rtl="0" eaLnBrk="1" latinLnBrk="0" hangingPunct="1">
+              <a:spcBef>
+                <a:spcPts val="0"/>
+              </a:spcBef>
+              <a:spcAft>
+                <a:spcPts val="1000"/>
+              </a:spcAft>
+              <a:buFontTx/>
+              <a:buBlip>
+                <a:blip r:embed="rId4"/>
+              </a:buBlip>
+              <a:defRPr sz="2000" kern="1200">
+                <a:solidFill>
+                  <a:schemeClr val="bg1"/>
+                </a:solidFill>
+                <a:effectLst>
+                  <a:outerShdw blurRad="38100" dist="38100" dir="2700000" algn="tl">
+                    <a:srgbClr val="000000">
+                      <a:alpha val="43137"/>
+                    </a:srgbClr>
+                  </a:outerShdw>
+                </a:effectLst>
+                <a:latin typeface="+mn-lt"/>
+                <a:ea typeface="+mn-ea"/>
+                <a:cs typeface="+mn-cs"/>
+              </a:defRPr>
+            </a:lvl3pPr>
+            <a:lvl4pPr marL="1196975" indent="-282575" algn="l" defTabSz="914400" rtl="0" eaLnBrk="1" latinLnBrk="0" hangingPunct="1">
+              <a:spcBef>
+                <a:spcPts val="0"/>
+              </a:spcBef>
+              <a:spcAft>
+                <a:spcPts val="1000"/>
+              </a:spcAft>
+              <a:buFontTx/>
+              <a:buBlip>
+                <a:blip r:embed="rId4"/>
+              </a:buBlip>
+              <a:defRPr sz="1800" kern="1200">
+                <a:solidFill>
+                  <a:schemeClr val="bg1"/>
+                </a:solidFill>
+                <a:effectLst>
+                  <a:outerShdw blurRad="38100" dist="38100" dir="2700000" algn="tl">
+                    <a:srgbClr val="000000">
+                      <a:alpha val="43137"/>
+                    </a:srgbClr>
+                  </a:outerShdw>
+                </a:effectLst>
+                <a:latin typeface="+mn-lt"/>
+                <a:ea typeface="+mn-ea"/>
+                <a:cs typeface="+mn-cs"/>
+              </a:defRPr>
+            </a:lvl4pPr>
+            <a:lvl5pPr marL="1492250" indent="-295275" algn="l" defTabSz="914400" rtl="0" eaLnBrk="1" latinLnBrk="0" hangingPunct="1">
+              <a:spcBef>
+                <a:spcPts val="0"/>
+              </a:spcBef>
+              <a:spcAft>
+                <a:spcPts val="1000"/>
+              </a:spcAft>
+              <a:buFontTx/>
+              <a:buBlip>
+                <a:blip r:embed="rId4"/>
+              </a:buBlip>
+              <a:defRPr sz="1800" kern="1200">
+                <a:solidFill>
+                  <a:schemeClr val="bg1"/>
+                </a:solidFill>
+                <a:effectLst>
+                  <a:outerShdw blurRad="38100" dist="38100" dir="2700000" algn="tl">
+                    <a:srgbClr val="000000">
+                      <a:alpha val="43137"/>
+                    </a:srgbClr>
+                  </a:outerShdw>
+                </a:effectLst>
+                <a:latin typeface="+mn-lt"/>
+                <a:ea typeface="+mn-ea"/>
+                <a:cs typeface="+mn-cs"/>
+              </a:defRPr>
+            </a:lvl5pPr>
+            <a:lvl6pPr marL="1774825" indent="-288925" algn="l" defTabSz="914400" rtl="0" eaLnBrk="1" latinLnBrk="0" hangingPunct="1">
+              <a:spcBef>
+                <a:spcPts val="0"/>
+              </a:spcBef>
+              <a:spcAft>
+                <a:spcPts val="600"/>
+              </a:spcAft>
+              <a:buFontTx/>
+              <a:buBlip>
+                <a:blip r:embed="rId4"/>
+              </a:buBlip>
+              <a:defRPr lang="en-US" sz="1800" kern="1200" dirty="0" smtClean="0">
+                <a:solidFill>
+                  <a:schemeClr val="bg1"/>
+                </a:solidFill>
+                <a:effectLst>
+                  <a:outerShdw blurRad="38100" dist="38100" dir="2700000" algn="tl">
+                    <a:srgbClr val="000000">
+                      <a:alpha val="43137"/>
+                    </a:srgbClr>
+                  </a:outerShdw>
+                </a:effectLst>
+                <a:latin typeface="+mn-lt"/>
+                <a:ea typeface="+mn-ea"/>
+                <a:cs typeface="+mn-cs"/>
+              </a:defRPr>
+            </a:lvl6pPr>
+            <a:lvl7pPr marL="2055813" indent="-288925" algn="l" defTabSz="914400" rtl="0" eaLnBrk="1" latinLnBrk="0" hangingPunct="1">
+              <a:spcBef>
+                <a:spcPts val="0"/>
+              </a:spcBef>
+              <a:spcAft>
+                <a:spcPts val="600"/>
+              </a:spcAft>
+              <a:buFontTx/>
+              <a:buBlip>
+                <a:blip r:embed="rId4"/>
+              </a:buBlip>
+              <a:defRPr lang="en-US" sz="1800" kern="1200" dirty="0" smtClean="0">
+                <a:solidFill>
+                  <a:schemeClr val="bg1"/>
+                </a:solidFill>
+                <a:effectLst>
+                  <a:outerShdw blurRad="38100" dist="38100" dir="2700000" algn="tl">
+                    <a:srgbClr val="000000">
+                      <a:alpha val="43137"/>
+                    </a:srgbClr>
+                  </a:outerShdw>
+                </a:effectLst>
+                <a:latin typeface="+mn-lt"/>
+                <a:ea typeface="+mn-ea"/>
+                <a:cs typeface="+mn-cs"/>
+              </a:defRPr>
+            </a:lvl7pPr>
+            <a:lvl8pPr marL="2344738" indent="-288925" algn="l" defTabSz="914400" rtl="0" eaLnBrk="1" latinLnBrk="0" hangingPunct="1">
+              <a:spcBef>
+                <a:spcPts val="0"/>
+              </a:spcBef>
+              <a:spcAft>
+                <a:spcPts val="600"/>
+              </a:spcAft>
+              <a:buFontTx/>
+              <a:buBlip>
+                <a:blip r:embed="rId4"/>
+              </a:buBlip>
+              <a:defRPr lang="en-US" sz="1800" kern="1200" dirty="0" smtClean="0">
+                <a:solidFill>
+                  <a:schemeClr val="bg1"/>
+                </a:solidFill>
+                <a:effectLst>
+                  <a:outerShdw blurRad="38100" dist="38100" dir="2700000" algn="tl">
+                    <a:srgbClr val="000000">
+                      <a:alpha val="43137"/>
+                    </a:srgbClr>
+                  </a:outerShdw>
+                </a:effectLst>
+                <a:latin typeface="+mn-lt"/>
+                <a:ea typeface="+mn-ea"/>
+                <a:cs typeface="+mn-cs"/>
+              </a:defRPr>
+            </a:lvl8pPr>
+            <a:lvl9pPr marL="2625725" indent="-288925" algn="l" defTabSz="914400" rtl="0" eaLnBrk="1" latinLnBrk="0" hangingPunct="1">
+              <a:spcBef>
+                <a:spcPts val="0"/>
+              </a:spcBef>
+              <a:spcAft>
+                <a:spcPts val="600"/>
+              </a:spcAft>
+              <a:buFontTx/>
+              <a:buBlip>
+                <a:blip r:embed="rId4"/>
+              </a:buBlip>
+              <a:defRPr lang="en-US" sz="1800" kern="1200" dirty="0">
+                <a:solidFill>
+                  <a:schemeClr val="bg1"/>
+                </a:solidFill>
+                <a:effectLst>
+                  <a:outerShdw blurRad="38100" dist="38100" dir="2700000" algn="tl">
+                    <a:srgbClr val="000000">
+                      <a:alpha val="43137"/>
+                    </a:srgbClr>
+                  </a:outerShdw>
+                </a:effectLst>
+                <a:latin typeface="+mn-lt"/>
+                <a:ea typeface="+mn-ea"/>
+                <a:cs typeface="+mn-cs"/>
+              </a:defRPr>
+            </a:lvl9pPr>
+          </a:lstStyle>
+          <a:p>
+            <a:r>
+              <a:rPr lang="en-US" dirty="0" smtClean="0"/>
+              <a:t>The player is directly involved – designing her own levels</a:t>
+            </a:r>
+          </a:p>
+          <a:p>
+            <a:endParaRPr lang="en-US" dirty="0"/>
+          </a:p>
+        </p:txBody>
+      </p:sp>
+    </p:spTree>
+    <p:extLst>
+      <p:ext uri="{BB962C8B-B14F-4D97-AF65-F5344CB8AC3E}">
+        <p14:creationId xmlns:p14="http://schemas.microsoft.com/office/powerpoint/2010/main" val="1184596343"/>
+      </p:ext>
+    </p:extLst>
+  </p:cSld>
+  <p:clrMapOvr>
+    <a:masterClrMapping/>
+  </p:clrMapOvr>
+  <p:timing>
+    <p:tnLst>
+      <p:par>
+        <p:cTn id="1" dur="indefinite" restart="never" nodeType="tmRoot"/>
+      </p:par>
+    </p:tnLst>
+  </p:timing>
+</p:sld>
+</file>
+
+<file path=ppt/slides/slide5.xml><?xml version="1.0" encoding="utf-8"?>
+<p:sld xmlns:a="http://schemas.openxmlformats.org/drawingml/2006/main" xmlns:r="http://schemas.openxmlformats.org/officeDocument/2006/relationships" xmlns:p="http://schemas.openxmlformats.org/presentationml/2006/main">
+  <p:cSld>
+    <p:spTree>
+      <p:nvGrpSpPr>
+        <p:cNvPr id="1" name=""/>
+        <p:cNvGrpSpPr/>
+        <p:nvPr/>
+      </p:nvGrpSpPr>
+      <p:grpSpPr>
+        <a:xfrm>
+          <a:off x="0" y="0"/>
+          <a:ext cx="0" cy="0"/>
+          <a:chOff x="0" y="0"/>
+          <a:chExt cx="0" cy="0"/>
+        </a:xfrm>
+      </p:grpSpPr>
+      <p:sp>
+        <p:nvSpPr>
+          <p:cNvPr id="2" name="Title 1"/>
+          <p:cNvSpPr>
+            <a:spLocks noGrp="1"/>
+          </p:cNvSpPr>
+          <p:nvPr>
+            <p:ph type="title"/>
+          </p:nvPr>
+        </p:nvSpPr>
+        <p:spPr/>
+        <p:txBody>
+          <a:bodyPr/>
+          <a:lstStyle/>
+          <a:p>
+            <a:r>
+              <a:rPr lang="en-US" dirty="0" smtClean="0"/>
+              <a:t>Game Flow</a:t>
             </a:r>
             <a:endParaRPr lang="en-US" dirty="0"/>
           </a:p>
@@ -18497,38 +19273,46 @@
         </p:nvSpPr>
         <p:spPr/>
         <p:txBody>
-          <a:bodyPr/>
+          <a:bodyPr>
+            <a:normAutofit fontScale="85000" lnSpcReduction="10000"/>
+          </a:bodyPr>
           <a:lstStyle/>
           <a:p>
             <a:r>
               <a:rPr lang="en-US" dirty="0" smtClean="0"/>
-              <a:t>Planned to be developed on mobile devices: Android, </a:t>
+              <a:t>Point the camera to the scene</a:t>
             </a:r>
-            <a:r>
-              <a:rPr lang="en-US" dirty="0" err="1" smtClean="0"/>
-              <a:t>iOS</a:t>
-            </a:r>
+          </a:p>
+          <a:p>
             <a:r>
               <a:rPr lang="en-US" dirty="0" smtClean="0"/>
-              <a:t> </a:t>
+              <a:t>Automatic object detection lets the user decide what she wants to destroy</a:t>
             </a:r>
-            <a:br>
-              <a:rPr lang="en-US" dirty="0" smtClean="0"/>
-            </a:br>
+          </a:p>
+          <a:p>
             <a:r>
               <a:rPr lang="en-US" dirty="0" smtClean="0"/>
-              <a:t>(as time permits)</a:t>
+              <a:t>Clicking to start releases a ball into the scene</a:t>
             </a:r>
           </a:p>
           <a:p>
-            <a:r>
-              <a:rPr lang="en-US" dirty="0" err="1" smtClean="0"/>
-              <a:t>OpenCV</a:t>
-            </a:r>
             <a:r>
               <a:rPr lang="en-US" dirty="0" smtClean="0"/>
-              <a:t> Library for image processing, analysis and manipulation</a:t>
+              <a:t>As the ball move, the scene is destroyed</a:t>
             </a:r>
+          </a:p>
+          <a:p>
+            <a:r>
+              <a:rPr lang="en-US" dirty="0" smtClean="0"/>
+              <a:t>Player can direct the ball using barrier points</a:t>
+            </a:r>
+          </a:p>
+          <a:p>
+            <a:r>
+              <a:rPr lang="en-US" dirty="0" smtClean="0"/>
+              <a:t>When the objects are destroyed, the player wins!</a:t>
+            </a:r>
+            <a:endParaRPr lang="en-US" dirty="0" smtClean="0"/>
           </a:p>
           <a:p>
             <a:pPr marL="0" indent="0">
@@ -18719,7 +19503,1197 @@
   <p:timing>
     <p:tnLst>
       <p:par>
-        <p:cTn xmlns:p14="http://schemas.microsoft.com/office/powerpoint/2010/main" id="1" dur="indefinite" restart="never" nodeType="tmRoot"/>
+        <p:cTn id="1" dur="indefinite" restart="never" nodeType="tmRoot"/>
+      </p:par>
+    </p:tnLst>
+  </p:timing>
+</p:sld>
+</file>
+
+<file path=ppt/slides/slide6.xml><?xml version="1.0" encoding="utf-8"?>
+<p:sld xmlns:a="http://schemas.openxmlformats.org/drawingml/2006/main" xmlns:r="http://schemas.openxmlformats.org/officeDocument/2006/relationships" xmlns:p="http://schemas.openxmlformats.org/presentationml/2006/main">
+  <p:cSld>
+    <p:spTree>
+      <p:nvGrpSpPr>
+        <p:cNvPr id="1" name=""/>
+        <p:cNvGrpSpPr/>
+        <p:nvPr/>
+      </p:nvGrpSpPr>
+      <p:grpSpPr>
+        <a:xfrm>
+          <a:off x="0" y="0"/>
+          <a:ext cx="0" cy="0"/>
+          <a:chOff x="0" y="0"/>
+          <a:chExt cx="0" cy="0"/>
+        </a:xfrm>
+      </p:grpSpPr>
+      <p:sp>
+        <p:nvSpPr>
+          <p:cNvPr id="2" name="Title 1"/>
+          <p:cNvSpPr>
+            <a:spLocks noGrp="1"/>
+          </p:cNvSpPr>
+          <p:nvPr>
+            <p:ph type="title"/>
+          </p:nvPr>
+        </p:nvSpPr>
+        <p:spPr/>
+        <p:txBody>
+          <a:bodyPr/>
+          <a:lstStyle/>
+          <a:p>
+            <a:r>
+              <a:rPr lang="en-US" dirty="0" smtClean="0"/>
+              <a:t>Rules</a:t>
+            </a:r>
+            <a:endParaRPr lang="en-US" dirty="0"/>
+          </a:p>
+        </p:txBody>
+      </p:sp>
+      <p:sp>
+        <p:nvSpPr>
+          <p:cNvPr id="3" name="Content Placeholder 2"/>
+          <p:cNvSpPr>
+            <a:spLocks noGrp="1"/>
+          </p:cNvSpPr>
+          <p:nvPr>
+            <p:ph idx="1"/>
+          </p:nvPr>
+        </p:nvSpPr>
+        <p:spPr/>
+        <p:txBody>
+          <a:bodyPr>
+            <a:normAutofit lnSpcReduction="10000"/>
+          </a:bodyPr>
+          <a:lstStyle/>
+          <a:p>
+            <a:r>
+              <a:rPr lang="en-US" dirty="0" smtClean="0"/>
+              <a:t>As the ball hits, it slowly destroys the objects</a:t>
+            </a:r>
+          </a:p>
+          <a:p>
+            <a:pPr lvl="1"/>
+            <a:r>
+              <a:rPr lang="en-US" dirty="0" smtClean="0"/>
+              <a:t>Destroy </a:t>
+            </a:r>
+            <a:r>
+              <a:rPr lang="en-US" dirty="0" smtClean="0">
+                <a:sym typeface="Wingdings" panose="05000000000000000000" pitchFamily="2" charset="2"/>
+              </a:rPr>
+              <a:t> Points!</a:t>
+            </a:r>
+            <a:endParaRPr lang="en-US" dirty="0" smtClean="0"/>
+          </a:p>
+          <a:p>
+            <a:r>
+              <a:rPr lang="en-US" dirty="0" smtClean="0"/>
+              <a:t>Time is limited though, so hurry up!</a:t>
+            </a:r>
+          </a:p>
+          <a:p>
+            <a:r>
+              <a:rPr lang="en-US" dirty="0" smtClean="0"/>
+              <a:t>You can direct the ball with barriers</a:t>
+            </a:r>
+          </a:p>
+          <a:p>
+            <a:pPr lvl="1"/>
+            <a:r>
+              <a:rPr lang="en-US" dirty="0" smtClean="0"/>
+              <a:t>But it will cost you…</a:t>
+            </a:r>
+          </a:p>
+          <a:p>
+            <a:r>
+              <a:rPr lang="en-US" dirty="0" smtClean="0"/>
+              <a:t>Objectives: have fun, wreak havoc </a:t>
+            </a:r>
+            <a:r>
+              <a:rPr lang="en-US" dirty="0" smtClean="0"/>
+              <a:t>(and get points)</a:t>
+            </a:r>
+            <a:endParaRPr lang="en-US" dirty="0" smtClean="0"/>
+          </a:p>
+          <a:p>
+            <a:pPr marL="0" indent="0">
+              <a:buNone/>
+            </a:pPr>
+            <a:endParaRPr lang="en-US" dirty="0" smtClean="0"/>
+          </a:p>
+          <a:p>
+            <a:endParaRPr lang="en-US" dirty="0"/>
+          </a:p>
+        </p:txBody>
+      </p:sp>
+      <p:grpSp>
+        <p:nvGrpSpPr>
+          <p:cNvPr id="8" name="Group 7"/>
+          <p:cNvGrpSpPr/>
+          <p:nvPr/>
+        </p:nvGrpSpPr>
+        <p:grpSpPr>
+          <a:xfrm>
+            <a:off x="9781784" y="855084"/>
+            <a:ext cx="1365466" cy="2211683"/>
+            <a:chOff x="2856785" y="57091"/>
+            <a:chExt cx="3846469" cy="6258661"/>
+          </a:xfrm>
+        </p:grpSpPr>
+        <p:sp>
+          <p:nvSpPr>
+            <p:cNvPr id="4" name="Rectangle 3"/>
+            <p:cNvSpPr/>
+            <p:nvPr/>
+          </p:nvSpPr>
+          <p:spPr>
+            <a:xfrm>
+              <a:off x="4046094" y="4981074"/>
+              <a:ext cx="1271864" cy="1049033"/>
+            </a:xfrm>
+            <a:prstGeom prst="rect">
+              <a:avLst/>
+            </a:prstGeom>
+            <a:solidFill>
+              <a:schemeClr val="bg1">
+                <a:lumMod val="65000"/>
+              </a:schemeClr>
+            </a:solidFill>
+          </p:spPr>
+          <p:style>
+            <a:lnRef idx="2">
+              <a:schemeClr val="accent1">
+                <a:shade val="50000"/>
+              </a:schemeClr>
+            </a:lnRef>
+            <a:fillRef idx="1">
+              <a:schemeClr val="accent1"/>
+            </a:fillRef>
+            <a:effectRef idx="0">
+              <a:schemeClr val="accent1"/>
+            </a:effectRef>
+            <a:fontRef idx="minor">
+              <a:schemeClr val="lt1"/>
+            </a:fontRef>
+          </p:style>
+          <p:txBody>
+            <a:bodyPr rtlCol="0" anchor="ctr"/>
+            <a:lstStyle/>
+            <a:p>
+              <a:pPr algn="ctr"/>
+              <a:endParaRPr lang="en-US"/>
+            </a:p>
+          </p:txBody>
+        </p:sp>
+        <p:sp>
+          <p:nvSpPr>
+            <p:cNvPr id="5" name="Rectangle 4"/>
+            <p:cNvSpPr/>
+            <p:nvPr/>
+          </p:nvSpPr>
+          <p:spPr>
+            <a:xfrm>
+              <a:off x="4144088" y="360122"/>
+              <a:ext cx="1271864" cy="269309"/>
+            </a:xfrm>
+            <a:prstGeom prst="rect">
+              <a:avLst/>
+            </a:prstGeom>
+            <a:solidFill>
+              <a:schemeClr val="bg1">
+                <a:lumMod val="65000"/>
+              </a:schemeClr>
+            </a:solidFill>
+          </p:spPr>
+          <p:style>
+            <a:lnRef idx="2">
+              <a:schemeClr val="accent1">
+                <a:shade val="50000"/>
+              </a:schemeClr>
+            </a:lnRef>
+            <a:fillRef idx="1">
+              <a:schemeClr val="accent1"/>
+            </a:fillRef>
+            <a:effectRef idx="0">
+              <a:schemeClr val="accent1"/>
+            </a:effectRef>
+            <a:fontRef idx="minor">
+              <a:schemeClr val="lt1"/>
+            </a:fontRef>
+          </p:style>
+          <p:txBody>
+            <a:bodyPr rtlCol="0" anchor="ctr"/>
+            <a:lstStyle/>
+            <a:p>
+              <a:pPr algn="ctr"/>
+              <a:endParaRPr lang="en-US"/>
+            </a:p>
+          </p:txBody>
+        </p:sp>
+        <p:pic>
+          <p:nvPicPr>
+            <p:cNvPr id="6" name="Content Placeholder 3"/>
+            <p:cNvPicPr>
+              <a:picLocks noChangeAspect="1"/>
+            </p:cNvPicPr>
+            <p:nvPr/>
+          </p:nvPicPr>
+          <p:blipFill>
+            <a:blip r:embed="rId2" cstate="print">
+              <a:extLst>
+                <a:ext uri="{28A0092B-C50C-407E-A947-70E740481C1C}">
+                  <a14:useLocalDpi xmlns:a14="http://schemas.microsoft.com/office/drawing/2010/main" val="0"/>
+                </a:ext>
+              </a:extLst>
+            </a:blip>
+            <a:stretch>
+              <a:fillRect/>
+            </a:stretch>
+          </p:blipFill>
+          <p:spPr>
+            <a:xfrm>
+              <a:off x="3042365" y="439383"/>
+              <a:ext cx="3478752" cy="4517630"/>
+            </a:xfrm>
+            <a:prstGeom prst="rect">
+              <a:avLst/>
+            </a:prstGeom>
+          </p:spPr>
+        </p:pic>
+        <p:pic>
+          <p:nvPicPr>
+            <p:cNvPr id="7" name="Picture 6"/>
+            <p:cNvPicPr>
+              <a:picLocks noChangeAspect="1"/>
+            </p:cNvPicPr>
+            <p:nvPr/>
+          </p:nvPicPr>
+          <p:blipFill>
+            <a:blip r:embed="rId3">
+              <a:extLst>
+                <a:ext uri="{28A0092B-C50C-407E-A947-70E740481C1C}">
+                  <a14:useLocalDpi xmlns:a14="http://schemas.microsoft.com/office/drawing/2010/main" val="0"/>
+                </a:ext>
+              </a:extLst>
+            </a:blip>
+            <a:stretch>
+              <a:fillRect/>
+            </a:stretch>
+          </p:blipFill>
+          <p:spPr>
+            <a:xfrm>
+              <a:off x="2856785" y="57091"/>
+              <a:ext cx="3846469" cy="6258661"/>
+            </a:xfrm>
+            <a:prstGeom prst="rect">
+              <a:avLst/>
+            </a:prstGeom>
+          </p:spPr>
+        </p:pic>
+      </p:grpSp>
+    </p:spTree>
+    <p:extLst>
+      <p:ext uri="{BB962C8B-B14F-4D97-AF65-F5344CB8AC3E}">
+        <p14:creationId xmlns:p14="http://schemas.microsoft.com/office/powerpoint/2010/main" val="672008265"/>
+      </p:ext>
+    </p:extLst>
+  </p:cSld>
+  <p:clrMapOvr>
+    <a:masterClrMapping/>
+  </p:clrMapOvr>
+  <p:timing>
+    <p:tnLst>
+      <p:par>
+        <p:cTn id="1" dur="indefinite" restart="never" nodeType="tmRoot"/>
+      </p:par>
+    </p:tnLst>
+  </p:timing>
+</p:sld>
+</file>
+
+<file path=ppt/slides/slide7.xml><?xml version="1.0" encoding="utf-8"?>
+<p:sld xmlns:a="http://schemas.openxmlformats.org/drawingml/2006/main" xmlns:r="http://schemas.openxmlformats.org/officeDocument/2006/relationships" xmlns:p="http://schemas.openxmlformats.org/presentationml/2006/main">
+  <p:cSld>
+    <p:spTree>
+      <p:nvGrpSpPr>
+        <p:cNvPr id="1" name=""/>
+        <p:cNvGrpSpPr/>
+        <p:nvPr/>
+      </p:nvGrpSpPr>
+      <p:grpSpPr>
+        <a:xfrm>
+          <a:off x="0" y="0"/>
+          <a:ext cx="0" cy="0"/>
+          <a:chOff x="0" y="0"/>
+          <a:chExt cx="0" cy="0"/>
+        </a:xfrm>
+      </p:grpSpPr>
+      <p:sp>
+        <p:nvSpPr>
+          <p:cNvPr id="2" name="Title 1"/>
+          <p:cNvSpPr>
+            <a:spLocks noGrp="1"/>
+          </p:cNvSpPr>
+          <p:nvPr>
+            <p:ph type="title"/>
+          </p:nvPr>
+        </p:nvSpPr>
+        <p:spPr/>
+        <p:txBody>
+          <a:bodyPr/>
+          <a:lstStyle/>
+          <a:p>
+            <a:r>
+              <a:rPr lang="en-US" dirty="0" err="1" smtClean="0"/>
+              <a:t>Gamification</a:t>
+            </a:r>
+            <a:r>
+              <a:rPr lang="en-US" dirty="0" smtClean="0"/>
+              <a:t> – Tension?</a:t>
+            </a:r>
+            <a:endParaRPr lang="en-US" dirty="0"/>
+          </a:p>
+        </p:txBody>
+      </p:sp>
+      <p:sp>
+        <p:nvSpPr>
+          <p:cNvPr id="3" name="Content Placeholder 2"/>
+          <p:cNvSpPr>
+            <a:spLocks noGrp="1"/>
+          </p:cNvSpPr>
+          <p:nvPr>
+            <p:ph idx="1"/>
+          </p:nvPr>
+        </p:nvSpPr>
+        <p:spPr/>
+        <p:txBody>
+          <a:bodyPr>
+            <a:normAutofit lnSpcReduction="10000"/>
+          </a:bodyPr>
+          <a:lstStyle/>
+          <a:p>
+            <a:r>
+              <a:rPr lang="en-US" dirty="0" smtClean="0"/>
+              <a:t>Limited time to destroy all objects</a:t>
+            </a:r>
+          </a:p>
+          <a:p>
+            <a:r>
+              <a:rPr lang="en-US" dirty="0" smtClean="0"/>
+              <a:t>Ball can run out of the scene so you have to be careful</a:t>
+            </a:r>
+          </a:p>
+          <a:p>
+            <a:r>
+              <a:rPr lang="en-US" dirty="0" smtClean="0"/>
+              <a:t>Incentive is to gain points</a:t>
+            </a:r>
+          </a:p>
+          <a:p>
+            <a:r>
+              <a:rPr lang="en-US" dirty="0" smtClean="0"/>
+              <a:t>Using more barriers costs points</a:t>
+            </a:r>
+          </a:p>
+          <a:p>
+            <a:pPr lvl="1"/>
+            <a:r>
+              <a:rPr lang="en-US" dirty="0" smtClean="0"/>
+              <a:t>sometimes a must (at the edges)</a:t>
+            </a:r>
+          </a:p>
+          <a:p>
+            <a:pPr lvl="1"/>
+            <a:r>
+              <a:rPr lang="en-US" dirty="0" smtClean="0"/>
+              <a:t>Other times – a </a:t>
+            </a:r>
+            <a:r>
+              <a:rPr lang="en-US" u="sng" dirty="0" smtClean="0"/>
+              <a:t>dilemma</a:t>
+            </a:r>
+            <a:r>
+              <a:rPr lang="en-US" dirty="0" smtClean="0"/>
+              <a:t>– save time or gain points?</a:t>
+            </a:r>
+          </a:p>
+          <a:p>
+            <a:pPr lvl="1"/>
+            <a:endParaRPr lang="en-US" dirty="0" smtClean="0"/>
+          </a:p>
+          <a:p>
+            <a:endParaRPr lang="en-US" dirty="0"/>
+          </a:p>
+        </p:txBody>
+      </p:sp>
+      <p:grpSp>
+        <p:nvGrpSpPr>
+          <p:cNvPr id="8" name="Group 7"/>
+          <p:cNvGrpSpPr/>
+          <p:nvPr/>
+        </p:nvGrpSpPr>
+        <p:grpSpPr>
+          <a:xfrm>
+            <a:off x="9781784" y="855084"/>
+            <a:ext cx="1365466" cy="2211683"/>
+            <a:chOff x="2856785" y="57091"/>
+            <a:chExt cx="3846469" cy="6258661"/>
+          </a:xfrm>
+        </p:grpSpPr>
+        <p:sp>
+          <p:nvSpPr>
+            <p:cNvPr id="4" name="Rectangle 3"/>
+            <p:cNvSpPr/>
+            <p:nvPr/>
+          </p:nvSpPr>
+          <p:spPr>
+            <a:xfrm>
+              <a:off x="4046094" y="4981074"/>
+              <a:ext cx="1271864" cy="1049033"/>
+            </a:xfrm>
+            <a:prstGeom prst="rect">
+              <a:avLst/>
+            </a:prstGeom>
+            <a:solidFill>
+              <a:schemeClr val="bg1">
+                <a:lumMod val="65000"/>
+              </a:schemeClr>
+            </a:solidFill>
+          </p:spPr>
+          <p:style>
+            <a:lnRef idx="2">
+              <a:schemeClr val="accent1">
+                <a:shade val="50000"/>
+              </a:schemeClr>
+            </a:lnRef>
+            <a:fillRef idx="1">
+              <a:schemeClr val="accent1"/>
+            </a:fillRef>
+            <a:effectRef idx="0">
+              <a:schemeClr val="accent1"/>
+            </a:effectRef>
+            <a:fontRef idx="minor">
+              <a:schemeClr val="lt1"/>
+            </a:fontRef>
+          </p:style>
+          <p:txBody>
+            <a:bodyPr rtlCol="0" anchor="ctr"/>
+            <a:lstStyle/>
+            <a:p>
+              <a:pPr algn="ctr"/>
+              <a:endParaRPr lang="en-US"/>
+            </a:p>
+          </p:txBody>
+        </p:sp>
+        <p:sp>
+          <p:nvSpPr>
+            <p:cNvPr id="5" name="Rectangle 4"/>
+            <p:cNvSpPr/>
+            <p:nvPr/>
+          </p:nvSpPr>
+          <p:spPr>
+            <a:xfrm>
+              <a:off x="4144088" y="360122"/>
+              <a:ext cx="1271864" cy="269309"/>
+            </a:xfrm>
+            <a:prstGeom prst="rect">
+              <a:avLst/>
+            </a:prstGeom>
+            <a:solidFill>
+              <a:schemeClr val="bg1">
+                <a:lumMod val="65000"/>
+              </a:schemeClr>
+            </a:solidFill>
+          </p:spPr>
+          <p:style>
+            <a:lnRef idx="2">
+              <a:schemeClr val="accent1">
+                <a:shade val="50000"/>
+              </a:schemeClr>
+            </a:lnRef>
+            <a:fillRef idx="1">
+              <a:schemeClr val="accent1"/>
+            </a:fillRef>
+            <a:effectRef idx="0">
+              <a:schemeClr val="accent1"/>
+            </a:effectRef>
+            <a:fontRef idx="minor">
+              <a:schemeClr val="lt1"/>
+            </a:fontRef>
+          </p:style>
+          <p:txBody>
+            <a:bodyPr rtlCol="0" anchor="ctr"/>
+            <a:lstStyle/>
+            <a:p>
+              <a:pPr algn="ctr"/>
+              <a:endParaRPr lang="en-US"/>
+            </a:p>
+          </p:txBody>
+        </p:sp>
+        <p:pic>
+          <p:nvPicPr>
+            <p:cNvPr id="6" name="Content Placeholder 3"/>
+            <p:cNvPicPr>
+              <a:picLocks noChangeAspect="1"/>
+            </p:cNvPicPr>
+            <p:nvPr/>
+          </p:nvPicPr>
+          <p:blipFill>
+            <a:blip r:embed="rId2" cstate="print">
+              <a:extLst>
+                <a:ext uri="{28A0092B-C50C-407E-A947-70E740481C1C}">
+                  <a14:useLocalDpi xmlns:a14="http://schemas.microsoft.com/office/drawing/2010/main" val="0"/>
+                </a:ext>
+              </a:extLst>
+            </a:blip>
+            <a:stretch>
+              <a:fillRect/>
+            </a:stretch>
+          </p:blipFill>
+          <p:spPr>
+            <a:xfrm>
+              <a:off x="3042365" y="439383"/>
+              <a:ext cx="3478752" cy="4517630"/>
+            </a:xfrm>
+            <a:prstGeom prst="rect">
+              <a:avLst/>
+            </a:prstGeom>
+          </p:spPr>
+        </p:pic>
+        <p:pic>
+          <p:nvPicPr>
+            <p:cNvPr id="7" name="Picture 6"/>
+            <p:cNvPicPr>
+              <a:picLocks noChangeAspect="1"/>
+            </p:cNvPicPr>
+            <p:nvPr/>
+          </p:nvPicPr>
+          <p:blipFill>
+            <a:blip r:embed="rId3">
+              <a:extLst>
+                <a:ext uri="{28A0092B-C50C-407E-A947-70E740481C1C}">
+                  <a14:useLocalDpi xmlns:a14="http://schemas.microsoft.com/office/drawing/2010/main" val="0"/>
+                </a:ext>
+              </a:extLst>
+            </a:blip>
+            <a:stretch>
+              <a:fillRect/>
+            </a:stretch>
+          </p:blipFill>
+          <p:spPr>
+            <a:xfrm>
+              <a:off x="2856785" y="57091"/>
+              <a:ext cx="3846469" cy="6258661"/>
+            </a:xfrm>
+            <a:prstGeom prst="rect">
+              <a:avLst/>
+            </a:prstGeom>
+          </p:spPr>
+        </p:pic>
+      </p:grpSp>
+    </p:spTree>
+    <p:extLst>
+      <p:ext uri="{BB962C8B-B14F-4D97-AF65-F5344CB8AC3E}">
+        <p14:creationId xmlns:p14="http://schemas.microsoft.com/office/powerpoint/2010/main" val="1277492"/>
+      </p:ext>
+    </p:extLst>
+  </p:cSld>
+  <p:clrMapOvr>
+    <a:masterClrMapping/>
+  </p:clrMapOvr>
+  <p:timing>
+    <p:tnLst>
+      <p:par>
+        <p:cTn id="1" dur="indefinite" restart="never" nodeType="tmRoot"/>
+      </p:par>
+    </p:tnLst>
+  </p:timing>
+</p:sld>
+</file>
+
+<file path=ppt/slides/slide8.xml><?xml version="1.0" encoding="utf-8"?>
+<p:sld xmlns:a="http://schemas.openxmlformats.org/drawingml/2006/main" xmlns:r="http://schemas.openxmlformats.org/officeDocument/2006/relationships" xmlns:p="http://schemas.openxmlformats.org/presentationml/2006/main">
+  <p:cSld>
+    <p:spTree>
+      <p:nvGrpSpPr>
+        <p:cNvPr id="1" name=""/>
+        <p:cNvGrpSpPr/>
+        <p:nvPr/>
+      </p:nvGrpSpPr>
+      <p:grpSpPr>
+        <a:xfrm>
+          <a:off x="0" y="0"/>
+          <a:ext cx="0" cy="0"/>
+          <a:chOff x="0" y="0"/>
+          <a:chExt cx="0" cy="0"/>
+        </a:xfrm>
+      </p:grpSpPr>
+      <p:sp>
+        <p:nvSpPr>
+          <p:cNvPr id="2" name="Title 1"/>
+          <p:cNvSpPr>
+            <a:spLocks noGrp="1"/>
+          </p:cNvSpPr>
+          <p:nvPr>
+            <p:ph type="title"/>
+          </p:nvPr>
+        </p:nvSpPr>
+        <p:spPr/>
+        <p:txBody>
+          <a:bodyPr/>
+          <a:lstStyle/>
+          <a:p>
+            <a:r>
+              <a:rPr lang="en-US" dirty="0" smtClean="0"/>
+              <a:t>Other</a:t>
+            </a:r>
+            <a:endParaRPr lang="en-US" dirty="0"/>
+          </a:p>
+        </p:txBody>
+      </p:sp>
+      <p:sp>
+        <p:nvSpPr>
+          <p:cNvPr id="3" name="Content Placeholder 2"/>
+          <p:cNvSpPr>
+            <a:spLocks noGrp="1"/>
+          </p:cNvSpPr>
+          <p:nvPr>
+            <p:ph idx="1"/>
+          </p:nvPr>
+        </p:nvSpPr>
+        <p:spPr/>
+        <p:txBody>
+          <a:bodyPr>
+            <a:normAutofit fontScale="92500" lnSpcReduction="10000"/>
+          </a:bodyPr>
+          <a:lstStyle/>
+          <a:p>
+            <a:r>
+              <a:rPr lang="en-US" dirty="0" smtClean="0"/>
+              <a:t>Increase tension with ball speed</a:t>
+            </a:r>
+          </a:p>
+          <a:p>
+            <a:r>
+              <a:rPr lang="en-US" dirty="0" smtClean="0"/>
+              <a:t>More incentive by randomly catching bonuses</a:t>
+            </a:r>
+          </a:p>
+          <a:p>
+            <a:pPr lvl="1"/>
+            <a:r>
+              <a:rPr lang="en-US" dirty="0" smtClean="0"/>
+              <a:t>More Time</a:t>
+            </a:r>
+          </a:p>
+          <a:p>
+            <a:pPr lvl="1"/>
+            <a:r>
+              <a:rPr lang="en-US" dirty="0" smtClean="0"/>
+              <a:t>Ball size (larger/smaller)</a:t>
+            </a:r>
+          </a:p>
+          <a:p>
+            <a:pPr lvl="1"/>
+            <a:r>
+              <a:rPr lang="en-US" dirty="0" smtClean="0"/>
+              <a:t>Speed up/down</a:t>
+            </a:r>
+          </a:p>
+          <a:p>
+            <a:pPr lvl="1"/>
+            <a:r>
+              <a:rPr lang="en-US" dirty="0" smtClean="0"/>
+              <a:t>“Fire Ball” (goes through objects</a:t>
+            </a:r>
+          </a:p>
+          <a:p>
+            <a:pPr lvl="1"/>
+            <a:r>
+              <a:rPr lang="en-US" dirty="0" smtClean="0"/>
+              <a:t>Multiple Balls…</a:t>
+            </a:r>
+            <a:endParaRPr lang="en-US" dirty="0"/>
+          </a:p>
+          <a:p>
+            <a:endParaRPr lang="en-US" dirty="0" smtClean="0"/>
+          </a:p>
+          <a:p>
+            <a:pPr lvl="1"/>
+            <a:endParaRPr lang="en-US" dirty="0" smtClean="0"/>
+          </a:p>
+          <a:p>
+            <a:endParaRPr lang="en-US" dirty="0"/>
+          </a:p>
+        </p:txBody>
+      </p:sp>
+      <p:grpSp>
+        <p:nvGrpSpPr>
+          <p:cNvPr id="8" name="Group 7"/>
+          <p:cNvGrpSpPr/>
+          <p:nvPr/>
+        </p:nvGrpSpPr>
+        <p:grpSpPr>
+          <a:xfrm>
+            <a:off x="9781784" y="855084"/>
+            <a:ext cx="1365466" cy="2211683"/>
+            <a:chOff x="2856785" y="57091"/>
+            <a:chExt cx="3846469" cy="6258661"/>
+          </a:xfrm>
+        </p:grpSpPr>
+        <p:sp>
+          <p:nvSpPr>
+            <p:cNvPr id="4" name="Rectangle 3"/>
+            <p:cNvSpPr/>
+            <p:nvPr/>
+          </p:nvSpPr>
+          <p:spPr>
+            <a:xfrm>
+              <a:off x="4046094" y="4981074"/>
+              <a:ext cx="1271864" cy="1049033"/>
+            </a:xfrm>
+            <a:prstGeom prst="rect">
+              <a:avLst/>
+            </a:prstGeom>
+            <a:solidFill>
+              <a:schemeClr val="bg1">
+                <a:lumMod val="65000"/>
+              </a:schemeClr>
+            </a:solidFill>
+          </p:spPr>
+          <p:style>
+            <a:lnRef idx="2">
+              <a:schemeClr val="accent1">
+                <a:shade val="50000"/>
+              </a:schemeClr>
+            </a:lnRef>
+            <a:fillRef idx="1">
+              <a:schemeClr val="accent1"/>
+            </a:fillRef>
+            <a:effectRef idx="0">
+              <a:schemeClr val="accent1"/>
+            </a:effectRef>
+            <a:fontRef idx="minor">
+              <a:schemeClr val="lt1"/>
+            </a:fontRef>
+          </p:style>
+          <p:txBody>
+            <a:bodyPr rtlCol="0" anchor="ctr"/>
+            <a:lstStyle/>
+            <a:p>
+              <a:pPr algn="ctr"/>
+              <a:endParaRPr lang="en-US"/>
+            </a:p>
+          </p:txBody>
+        </p:sp>
+        <p:sp>
+          <p:nvSpPr>
+            <p:cNvPr id="5" name="Rectangle 4"/>
+            <p:cNvSpPr/>
+            <p:nvPr/>
+          </p:nvSpPr>
+          <p:spPr>
+            <a:xfrm>
+              <a:off x="4144088" y="360122"/>
+              <a:ext cx="1271864" cy="269309"/>
+            </a:xfrm>
+            <a:prstGeom prst="rect">
+              <a:avLst/>
+            </a:prstGeom>
+            <a:solidFill>
+              <a:schemeClr val="bg1">
+                <a:lumMod val="65000"/>
+              </a:schemeClr>
+            </a:solidFill>
+          </p:spPr>
+          <p:style>
+            <a:lnRef idx="2">
+              <a:schemeClr val="accent1">
+                <a:shade val="50000"/>
+              </a:schemeClr>
+            </a:lnRef>
+            <a:fillRef idx="1">
+              <a:schemeClr val="accent1"/>
+            </a:fillRef>
+            <a:effectRef idx="0">
+              <a:schemeClr val="accent1"/>
+            </a:effectRef>
+            <a:fontRef idx="minor">
+              <a:schemeClr val="lt1"/>
+            </a:fontRef>
+          </p:style>
+          <p:txBody>
+            <a:bodyPr rtlCol="0" anchor="ctr"/>
+            <a:lstStyle/>
+            <a:p>
+              <a:pPr algn="ctr"/>
+              <a:endParaRPr lang="en-US"/>
+            </a:p>
+          </p:txBody>
+        </p:sp>
+        <p:pic>
+          <p:nvPicPr>
+            <p:cNvPr id="6" name="Content Placeholder 3"/>
+            <p:cNvPicPr>
+              <a:picLocks noChangeAspect="1"/>
+            </p:cNvPicPr>
+            <p:nvPr/>
+          </p:nvPicPr>
+          <p:blipFill>
+            <a:blip r:embed="rId2" cstate="print">
+              <a:extLst>
+                <a:ext uri="{28A0092B-C50C-407E-A947-70E740481C1C}">
+                  <a14:useLocalDpi xmlns:a14="http://schemas.microsoft.com/office/drawing/2010/main" val="0"/>
+                </a:ext>
+              </a:extLst>
+            </a:blip>
+            <a:stretch>
+              <a:fillRect/>
+            </a:stretch>
+          </p:blipFill>
+          <p:spPr>
+            <a:xfrm>
+              <a:off x="3042365" y="439383"/>
+              <a:ext cx="3478752" cy="4517630"/>
+            </a:xfrm>
+            <a:prstGeom prst="rect">
+              <a:avLst/>
+            </a:prstGeom>
+          </p:spPr>
+        </p:pic>
+        <p:pic>
+          <p:nvPicPr>
+            <p:cNvPr id="7" name="Picture 6"/>
+            <p:cNvPicPr>
+              <a:picLocks noChangeAspect="1"/>
+            </p:cNvPicPr>
+            <p:nvPr/>
+          </p:nvPicPr>
+          <p:blipFill>
+            <a:blip r:embed="rId3">
+              <a:extLst>
+                <a:ext uri="{28A0092B-C50C-407E-A947-70E740481C1C}">
+                  <a14:useLocalDpi xmlns:a14="http://schemas.microsoft.com/office/drawing/2010/main" val="0"/>
+                </a:ext>
+              </a:extLst>
+            </a:blip>
+            <a:stretch>
+              <a:fillRect/>
+            </a:stretch>
+          </p:blipFill>
+          <p:spPr>
+            <a:xfrm>
+              <a:off x="2856785" y="57091"/>
+              <a:ext cx="3846469" cy="6258661"/>
+            </a:xfrm>
+            <a:prstGeom prst="rect">
+              <a:avLst/>
+            </a:prstGeom>
+          </p:spPr>
+        </p:pic>
+      </p:grpSp>
+    </p:spTree>
+    <p:extLst>
+      <p:ext uri="{BB962C8B-B14F-4D97-AF65-F5344CB8AC3E}">
+        <p14:creationId xmlns:p14="http://schemas.microsoft.com/office/powerpoint/2010/main" val="68326639"/>
+      </p:ext>
+    </p:extLst>
+  </p:cSld>
+  <p:clrMapOvr>
+    <a:masterClrMapping/>
+  </p:clrMapOvr>
+  <p:timing>
+    <p:tnLst>
+      <p:par>
+        <p:cTn id="1" dur="indefinite" restart="never" nodeType="tmRoot"/>
+      </p:par>
+    </p:tnLst>
+  </p:timing>
+</p:sld>
+</file>
+
+<file path=ppt/slides/slide9.xml><?xml version="1.0" encoding="utf-8"?>
+<p:sld xmlns:a="http://schemas.openxmlformats.org/drawingml/2006/main" xmlns:r="http://schemas.openxmlformats.org/officeDocument/2006/relationships" xmlns:p="http://schemas.openxmlformats.org/presentationml/2006/main">
+  <p:cSld>
+    <p:spTree>
+      <p:nvGrpSpPr>
+        <p:cNvPr id="1" name=""/>
+        <p:cNvGrpSpPr/>
+        <p:nvPr/>
+      </p:nvGrpSpPr>
+      <p:grpSpPr>
+        <a:xfrm>
+          <a:off x="0" y="0"/>
+          <a:ext cx="0" cy="0"/>
+          <a:chOff x="0" y="0"/>
+          <a:chExt cx="0" cy="0"/>
+        </a:xfrm>
+      </p:grpSpPr>
+      <p:sp>
+        <p:nvSpPr>
+          <p:cNvPr id="2" name="Title 1"/>
+          <p:cNvSpPr>
+            <a:spLocks noGrp="1"/>
+          </p:cNvSpPr>
+          <p:nvPr>
+            <p:ph type="title"/>
+          </p:nvPr>
+        </p:nvSpPr>
+        <p:spPr/>
+        <p:txBody>
+          <a:bodyPr/>
+          <a:lstStyle/>
+          <a:p>
+            <a:r>
+              <a:rPr lang="en-US" dirty="0" smtClean="0"/>
+              <a:t>Social Aspects?</a:t>
+            </a:r>
+            <a:endParaRPr lang="en-US" dirty="0"/>
+          </a:p>
+        </p:txBody>
+      </p:sp>
+      <p:sp>
+        <p:nvSpPr>
+          <p:cNvPr id="3" name="Content Placeholder 2"/>
+          <p:cNvSpPr>
+            <a:spLocks noGrp="1"/>
+          </p:cNvSpPr>
+          <p:nvPr>
+            <p:ph idx="1"/>
+          </p:nvPr>
+        </p:nvSpPr>
+        <p:spPr/>
+        <p:txBody>
+          <a:bodyPr>
+            <a:normAutofit/>
+          </a:bodyPr>
+          <a:lstStyle/>
+          <a:p>
+            <a:r>
+              <a:rPr lang="en-US" dirty="0" smtClean="0"/>
+              <a:t>Share your game-play in social media </a:t>
+            </a:r>
+          </a:p>
+          <a:p>
+            <a:pPr lvl="1"/>
+            <a:r>
+              <a:rPr lang="en-US" dirty="0" smtClean="0"/>
+              <a:t>Either as a movie or a photo</a:t>
+            </a:r>
+          </a:p>
+          <a:p>
+            <a:r>
+              <a:rPr lang="en-US" dirty="0" smtClean="0"/>
+              <a:t>Multiplayer:</a:t>
+            </a:r>
+          </a:p>
+          <a:p>
+            <a:pPr lvl="1"/>
+            <a:r>
+              <a:rPr lang="en-US" dirty="0" smtClean="0"/>
+              <a:t>Collaborate with another person on scene (random pickup – make new friends ;-)</a:t>
+            </a:r>
+          </a:p>
+          <a:p>
+            <a:pPr lvl="1"/>
+            <a:r>
+              <a:rPr lang="en-US" dirty="0" smtClean="0"/>
+              <a:t>Vs. mode – you have to save your objects and destroy your opponents’ (random pickup – make new enemies)</a:t>
+            </a:r>
+            <a:endParaRPr lang="en-US" dirty="0"/>
+          </a:p>
+          <a:p>
+            <a:endParaRPr lang="en-US" dirty="0" smtClean="0"/>
+          </a:p>
+          <a:p>
+            <a:pPr lvl="1"/>
+            <a:endParaRPr lang="en-US" dirty="0" smtClean="0"/>
+          </a:p>
+          <a:p>
+            <a:endParaRPr lang="en-US" dirty="0"/>
+          </a:p>
+        </p:txBody>
+      </p:sp>
+      <p:grpSp>
+        <p:nvGrpSpPr>
+          <p:cNvPr id="8" name="Group 7"/>
+          <p:cNvGrpSpPr/>
+          <p:nvPr/>
+        </p:nvGrpSpPr>
+        <p:grpSpPr>
+          <a:xfrm>
+            <a:off x="9781784" y="855084"/>
+            <a:ext cx="1365466" cy="2211683"/>
+            <a:chOff x="2856785" y="57091"/>
+            <a:chExt cx="3846469" cy="6258661"/>
+          </a:xfrm>
+        </p:grpSpPr>
+        <p:sp>
+          <p:nvSpPr>
+            <p:cNvPr id="4" name="Rectangle 3"/>
+            <p:cNvSpPr/>
+            <p:nvPr/>
+          </p:nvSpPr>
+          <p:spPr>
+            <a:xfrm>
+              <a:off x="4046094" y="4981074"/>
+              <a:ext cx="1271864" cy="1049033"/>
+            </a:xfrm>
+            <a:prstGeom prst="rect">
+              <a:avLst/>
+            </a:prstGeom>
+            <a:solidFill>
+              <a:schemeClr val="bg1">
+                <a:lumMod val="65000"/>
+              </a:schemeClr>
+            </a:solidFill>
+          </p:spPr>
+          <p:style>
+            <a:lnRef idx="2">
+              <a:schemeClr val="accent1">
+                <a:shade val="50000"/>
+              </a:schemeClr>
+            </a:lnRef>
+            <a:fillRef idx="1">
+              <a:schemeClr val="accent1"/>
+            </a:fillRef>
+            <a:effectRef idx="0">
+              <a:schemeClr val="accent1"/>
+            </a:effectRef>
+            <a:fontRef idx="minor">
+              <a:schemeClr val="lt1"/>
+            </a:fontRef>
+          </p:style>
+          <p:txBody>
+            <a:bodyPr rtlCol="0" anchor="ctr"/>
+            <a:lstStyle/>
+            <a:p>
+              <a:pPr algn="ctr"/>
+              <a:endParaRPr lang="en-US"/>
+            </a:p>
+          </p:txBody>
+        </p:sp>
+        <p:sp>
+          <p:nvSpPr>
+            <p:cNvPr id="5" name="Rectangle 4"/>
+            <p:cNvSpPr/>
+            <p:nvPr/>
+          </p:nvSpPr>
+          <p:spPr>
+            <a:xfrm>
+              <a:off x="4144088" y="360122"/>
+              <a:ext cx="1271864" cy="269309"/>
+            </a:xfrm>
+            <a:prstGeom prst="rect">
+              <a:avLst/>
+            </a:prstGeom>
+            <a:solidFill>
+              <a:schemeClr val="bg1">
+                <a:lumMod val="65000"/>
+              </a:schemeClr>
+            </a:solidFill>
+          </p:spPr>
+          <p:style>
+            <a:lnRef idx="2">
+              <a:schemeClr val="accent1">
+                <a:shade val="50000"/>
+              </a:schemeClr>
+            </a:lnRef>
+            <a:fillRef idx="1">
+              <a:schemeClr val="accent1"/>
+            </a:fillRef>
+            <a:effectRef idx="0">
+              <a:schemeClr val="accent1"/>
+            </a:effectRef>
+            <a:fontRef idx="minor">
+              <a:schemeClr val="lt1"/>
+            </a:fontRef>
+          </p:style>
+          <p:txBody>
+            <a:bodyPr rtlCol="0" anchor="ctr"/>
+            <a:lstStyle/>
+            <a:p>
+              <a:pPr algn="ctr"/>
+              <a:endParaRPr lang="en-US"/>
+            </a:p>
+          </p:txBody>
+        </p:sp>
+        <p:pic>
+          <p:nvPicPr>
+            <p:cNvPr id="6" name="Content Placeholder 3"/>
+            <p:cNvPicPr>
+              <a:picLocks noChangeAspect="1"/>
+            </p:cNvPicPr>
+            <p:nvPr/>
+          </p:nvPicPr>
+          <p:blipFill>
+            <a:blip r:embed="rId2" cstate="print">
+              <a:extLst>
+                <a:ext uri="{28A0092B-C50C-407E-A947-70E740481C1C}">
+                  <a14:useLocalDpi xmlns:a14="http://schemas.microsoft.com/office/drawing/2010/main" val="0"/>
+                </a:ext>
+              </a:extLst>
+            </a:blip>
+            <a:stretch>
+              <a:fillRect/>
+            </a:stretch>
+          </p:blipFill>
+          <p:spPr>
+            <a:xfrm>
+              <a:off x="3042365" y="439383"/>
+              <a:ext cx="3478752" cy="4517630"/>
+            </a:xfrm>
+            <a:prstGeom prst="rect">
+              <a:avLst/>
+            </a:prstGeom>
+          </p:spPr>
+        </p:pic>
+        <p:pic>
+          <p:nvPicPr>
+            <p:cNvPr id="7" name="Picture 6"/>
+            <p:cNvPicPr>
+              <a:picLocks noChangeAspect="1"/>
+            </p:cNvPicPr>
+            <p:nvPr/>
+          </p:nvPicPr>
+          <p:blipFill>
+            <a:blip r:embed="rId3">
+              <a:extLst>
+                <a:ext uri="{28A0092B-C50C-407E-A947-70E740481C1C}">
+                  <a14:useLocalDpi xmlns:a14="http://schemas.microsoft.com/office/drawing/2010/main" val="0"/>
+                </a:ext>
+              </a:extLst>
+            </a:blip>
+            <a:stretch>
+              <a:fillRect/>
+            </a:stretch>
+          </p:blipFill>
+          <p:spPr>
+            <a:xfrm>
+              <a:off x="2856785" y="57091"/>
+              <a:ext cx="3846469" cy="6258661"/>
+            </a:xfrm>
+            <a:prstGeom prst="rect">
+              <a:avLst/>
+            </a:prstGeom>
+          </p:spPr>
+        </p:pic>
+      </p:grpSp>
+    </p:spTree>
+    <p:extLst>
+      <p:ext uri="{BB962C8B-B14F-4D97-AF65-F5344CB8AC3E}">
+        <p14:creationId xmlns:p14="http://schemas.microsoft.com/office/powerpoint/2010/main" val="2863958477"/>
+      </p:ext>
+    </p:extLst>
+  </p:cSld>
+  <p:clrMapOvr>
+    <a:masterClrMapping/>
+  </p:clrMapOvr>
+  <p:timing>
+    <p:tnLst>
+      <p:par>
+        <p:cTn id="1" dur="indefinite" restart="never" nodeType="tmRoot"/>
       </p:par>
     </p:tnLst>
   </p:timing>

</xml_diff>